<commit_message>
Updating Code review Slides with example
</commit_message>
<xml_diff>
--- a/notes/Lecture_03.pptx
+++ b/notes/Lecture_03.pptx
@@ -6,10 +6,10 @@
     <p:sldMasterId id="2147483801" r:id="rId2"/>
   </p:sldMasterIdLst>
   <p:notesMasterIdLst>
-    <p:notesMasterId r:id="rId24"/>
+    <p:notesMasterId r:id="rId25"/>
   </p:notesMasterIdLst>
   <p:handoutMasterIdLst>
-    <p:handoutMasterId r:id="rId25"/>
+    <p:handoutMasterId r:id="rId26"/>
   </p:handoutMasterIdLst>
   <p:sldIdLst>
     <p:sldId id="256" r:id="rId3"/>
@@ -33,6 +33,7 @@
     <p:sldId id="320" r:id="rId21"/>
     <p:sldId id="306" r:id="rId22"/>
     <p:sldId id="305" r:id="rId23"/>
+    <p:sldId id="323" r:id="rId24"/>
   </p:sldIdLst>
   <p:sldSz cx="12192000" cy="6858000"/>
   <p:notesSz cx="7010400" cy="9296400"/>
@@ -36471,7 +36472,12 @@
             <p:ph type="ctrTitle"/>
           </p:nvPr>
         </p:nvSpPr>
-        <p:spPr/>
+        <p:spPr>
+          <a:xfrm>
+            <a:off x="1524000" y="790405"/>
+            <a:ext cx="9144000" cy="1835150"/>
+          </a:xfrm>
+        </p:spPr>
         <p:txBody>
           <a:bodyPr>
             <a:normAutofit/>
@@ -36501,7 +36507,12 @@
             <p:ph type="subTitle" idx="1"/>
           </p:nvPr>
         </p:nvSpPr>
-        <p:spPr/>
+        <p:spPr>
+          <a:xfrm>
+            <a:off x="1524000" y="2637462"/>
+            <a:ext cx="9144000" cy="1655762"/>
+          </a:xfrm>
+        </p:spPr>
         <p:txBody>
           <a:bodyPr>
             <a:normAutofit lnSpcReduction="10000"/>
@@ -36545,6 +36556,106 @@
               <a:t>igorsteinmacher</a:t>
             </a:r>
             <a:endParaRPr lang="en-US" dirty="0"/>
+          </a:p>
+        </p:txBody>
+      </p:sp>
+      <p:sp>
+        <p:nvSpPr>
+          <p:cNvPr id="2" name="TextBox 1">
+            <a:extLst>
+              <a:ext uri="{FF2B5EF4-FFF2-40B4-BE49-F238E27FC236}">
+                <a16:creationId xmlns:a16="http://schemas.microsoft.com/office/drawing/2014/main" id="{C12E552C-3B9A-9D6C-1253-7272EDD1C397}"/>
+              </a:ext>
+            </a:extLst>
+          </p:cNvPr>
+          <p:cNvSpPr txBox="1"/>
+          <p:nvPr/>
+        </p:nvSpPr>
+        <p:spPr>
+          <a:xfrm>
+            <a:off x="3321844" y="4677115"/>
+            <a:ext cx="8870156" cy="830997"/>
+          </a:xfrm>
+          <a:prstGeom prst="rect">
+            <a:avLst/>
+          </a:prstGeom>
+          <a:noFill/>
+        </p:spPr>
+        <p:txBody>
+          <a:bodyPr wrap="square">
+            <a:spAutoFit/>
+          </a:bodyPr>
+          <a:lstStyle/>
+          <a:p>
+            <a:pPr algn="r"/>
+            <a:r>
+              <a:rPr lang="en-US" sz="1600" dirty="0">
+                <a:solidFill>
+                  <a:schemeClr val="bg1"/>
+                </a:solidFill>
+              </a:rPr>
+              <a:t>Credits:</a:t>
+            </a:r>
+            <a:br>
+              <a:rPr lang="en-US" sz="1600" dirty="0">
+                <a:solidFill>
+                  <a:schemeClr val="bg1"/>
+                </a:solidFill>
+              </a:rPr>
+            </a:br>
+            <a:r>
+              <a:rPr lang="en-US" sz="1600" dirty="0">
+                <a:solidFill>
+                  <a:schemeClr val="bg1"/>
+                </a:solidFill>
+              </a:rPr>
+              <a:t>Based on the Slides from </a:t>
+            </a:r>
+            <a:r>
+              <a:rPr lang="en-US" sz="1600" dirty="0" err="1">
+                <a:solidFill>
+                  <a:schemeClr val="bg1"/>
+                </a:solidFill>
+              </a:rPr>
+              <a:t>Patanamon</a:t>
+            </a:r>
+            <a:r>
+              <a:rPr lang="en-US" sz="1600" dirty="0">
+                <a:solidFill>
+                  <a:schemeClr val="bg1"/>
+                </a:solidFill>
+              </a:rPr>
+              <a:t> (Pick) </a:t>
+            </a:r>
+            <a:r>
+              <a:rPr lang="en-US" sz="1600" dirty="0" err="1">
+                <a:solidFill>
+                  <a:schemeClr val="bg1"/>
+                </a:solidFill>
+              </a:rPr>
+              <a:t>Thongtanunam</a:t>
+            </a:r>
+            <a:endParaRPr lang="en-US" sz="1600" dirty="0">
+              <a:solidFill>
+                <a:schemeClr val="bg1"/>
+              </a:solidFill>
+            </a:endParaRPr>
+          </a:p>
+          <a:p>
+            <a:pPr algn="r"/>
+            <a:r>
+              <a:rPr lang="en-US" sz="1600" dirty="0" err="1">
+                <a:solidFill>
+                  <a:schemeClr val="bg1"/>
+                </a:solidFill>
+              </a:rPr>
+              <a:t>patanamon.t@unimelb.edu.au</a:t>
+            </a:r>
+            <a:endParaRPr lang="en-US" sz="1600" dirty="0">
+              <a:solidFill>
+                <a:schemeClr val="bg1"/>
+              </a:solidFill>
+            </a:endParaRPr>
           </a:p>
         </p:txBody>
       </p:sp>
@@ -39571,6 +39682,1921 @@
     <p:extLst>
       <p:ext uri="{BB962C8B-B14F-4D97-AF65-F5344CB8AC3E}">
         <p14:creationId xmlns:p14="http://schemas.microsoft.com/office/powerpoint/2010/main" val="2527445523"/>
+      </p:ext>
+    </p:extLst>
+  </p:cSld>
+  <p:clrMapOvr>
+    <a:masterClrMapping/>
+  </p:clrMapOvr>
+</p:sld>
+</file>
+
+<file path=ppt/slides/slide22.xml><?xml version="1.0" encoding="utf-8"?>
+<p:sld xmlns:a="http://schemas.openxmlformats.org/drawingml/2006/main" xmlns:r="http://schemas.openxmlformats.org/officeDocument/2006/relationships" xmlns:p="http://schemas.openxmlformats.org/presentationml/2006/main">
+  <p:cSld>
+    <p:spTree>
+      <p:nvGrpSpPr>
+        <p:cNvPr id="1" name=""/>
+        <p:cNvGrpSpPr/>
+        <p:nvPr/>
+      </p:nvGrpSpPr>
+      <p:grpSpPr>
+        <a:xfrm>
+          <a:off x="0" y="0"/>
+          <a:ext cx="0" cy="0"/>
+          <a:chOff x="0" y="0"/>
+          <a:chExt cx="0" cy="0"/>
+        </a:xfrm>
+      </p:grpSpPr>
+      <p:sp>
+        <p:nvSpPr>
+          <p:cNvPr id="2" name="Content Placeholder 1">
+            <a:extLst>
+              <a:ext uri="{FF2B5EF4-FFF2-40B4-BE49-F238E27FC236}">
+                <a16:creationId xmlns:a16="http://schemas.microsoft.com/office/drawing/2014/main" id="{D7802702-10A9-618F-FF99-9D65764D36A3}"/>
+              </a:ext>
+            </a:extLst>
+          </p:cNvPr>
+          <p:cNvSpPr>
+            <a:spLocks noGrp="1"/>
+          </p:cNvSpPr>
+          <p:nvPr>
+            <p:ph idx="1"/>
+          </p:nvPr>
+        </p:nvSpPr>
+        <p:spPr>
+          <a:xfrm>
+            <a:off x="0" y="0"/>
+            <a:ext cx="12192000" cy="6858000"/>
+          </a:xfrm>
+          <a:solidFill>
+            <a:schemeClr val="bg1"/>
+          </a:solidFill>
+        </p:spPr>
+        <p:txBody>
+          <a:bodyPr>
+            <a:normAutofit fontScale="62500" lnSpcReduction="20000"/>
+          </a:bodyPr>
+          <a:lstStyle/>
+          <a:p>
+            <a:pPr marL="0" indent="0">
+              <a:buNone/>
+            </a:pPr>
+            <a:br>
+              <a:rPr lang="en-US" dirty="0">
+                <a:solidFill>
+                  <a:srgbClr val="FF0000"/>
+                </a:solidFill>
+                <a:latin typeface="Courier" pitchFamily="2" charset="0"/>
+              </a:rPr>
+            </a:br>
+            <a:br>
+              <a:rPr lang="en-US" dirty="0">
+                <a:solidFill>
+                  <a:srgbClr val="FF0000"/>
+                </a:solidFill>
+                <a:latin typeface="Courier" pitchFamily="2" charset="0"/>
+              </a:rPr>
+            </a:br>
+            <a:r>
+              <a:rPr lang="en-US" dirty="0">
+                <a:solidFill>
+                  <a:srgbClr val="FF0000"/>
+                </a:solidFill>
+                <a:latin typeface="Courier" pitchFamily="2" charset="0"/>
+              </a:rPr>
+              <a:t>public static</a:t>
+            </a:r>
+            <a:r>
+              <a:rPr lang="en-US" dirty="0">
+                <a:latin typeface="Courier" pitchFamily="2" charset="0"/>
+              </a:rPr>
+              <a:t> </a:t>
+            </a:r>
+            <a:r>
+              <a:rPr lang="en-US" i="1" dirty="0">
+                <a:solidFill>
+                  <a:srgbClr val="00B050"/>
+                </a:solidFill>
+                <a:latin typeface="Courier" pitchFamily="2" charset="0"/>
+              </a:rPr>
+              <a:t>int</a:t>
+            </a:r>
+            <a:r>
+              <a:rPr lang="en-US" dirty="0">
+                <a:latin typeface="Courier" pitchFamily="2" charset="0"/>
+              </a:rPr>
+              <a:t> </a:t>
+            </a:r>
+            <a:r>
+              <a:rPr lang="en-US" dirty="0" err="1">
+                <a:latin typeface="Courier" pitchFamily="2" charset="0"/>
+              </a:rPr>
+              <a:t>dayOfYear</a:t>
+            </a:r>
+            <a:r>
+              <a:rPr lang="en-US" dirty="0">
+                <a:latin typeface="Courier" pitchFamily="2" charset="0"/>
+              </a:rPr>
+              <a:t>(</a:t>
+            </a:r>
+            <a:r>
+              <a:rPr lang="en-US" i="1" dirty="0">
+                <a:solidFill>
+                  <a:srgbClr val="00B050"/>
+                </a:solidFill>
+                <a:latin typeface="Courier" pitchFamily="2" charset="0"/>
+              </a:rPr>
+              <a:t>int</a:t>
+            </a:r>
+            <a:r>
+              <a:rPr lang="en-US" dirty="0">
+                <a:latin typeface="Courier" pitchFamily="2" charset="0"/>
+              </a:rPr>
+              <a:t> </a:t>
+            </a:r>
+            <a:r>
+              <a:rPr lang="en-US" dirty="0">
+                <a:solidFill>
+                  <a:schemeClr val="tx2">
+                    <a:lumMod val="75000"/>
+                  </a:schemeClr>
+                </a:solidFill>
+                <a:latin typeface="Courier" pitchFamily="2" charset="0"/>
+              </a:rPr>
+              <a:t>month</a:t>
+            </a:r>
+            <a:r>
+              <a:rPr lang="en-US" dirty="0">
+                <a:latin typeface="Courier" pitchFamily="2" charset="0"/>
+              </a:rPr>
+              <a:t>, </a:t>
+            </a:r>
+            <a:r>
+              <a:rPr lang="en-US" i="1" dirty="0">
+                <a:solidFill>
+                  <a:srgbClr val="00B050"/>
+                </a:solidFill>
+                <a:latin typeface="Courier" pitchFamily="2" charset="0"/>
+              </a:rPr>
+              <a:t>int</a:t>
+            </a:r>
+            <a:r>
+              <a:rPr lang="en-US" dirty="0">
+                <a:latin typeface="Courier" pitchFamily="2" charset="0"/>
+              </a:rPr>
+              <a:t> </a:t>
+            </a:r>
+            <a:r>
+              <a:rPr lang="en-US" dirty="0" err="1">
+                <a:solidFill>
+                  <a:schemeClr val="tx2">
+                    <a:lumMod val="75000"/>
+                  </a:schemeClr>
+                </a:solidFill>
+                <a:latin typeface="Courier" pitchFamily="2" charset="0"/>
+              </a:rPr>
+              <a:t>dayOfMonth</a:t>
+            </a:r>
+            <a:r>
+              <a:rPr lang="en-US" dirty="0">
+                <a:latin typeface="Courier" pitchFamily="2" charset="0"/>
+              </a:rPr>
+              <a:t>, </a:t>
+            </a:r>
+            <a:r>
+              <a:rPr lang="en-US" i="1" dirty="0">
+                <a:solidFill>
+                  <a:srgbClr val="00B050"/>
+                </a:solidFill>
+                <a:latin typeface="Courier" pitchFamily="2" charset="0"/>
+              </a:rPr>
+              <a:t>int</a:t>
+            </a:r>
+            <a:r>
+              <a:rPr lang="en-US" dirty="0">
+                <a:latin typeface="Courier" pitchFamily="2" charset="0"/>
+              </a:rPr>
+              <a:t> </a:t>
+            </a:r>
+            <a:r>
+              <a:rPr lang="en-US" dirty="0">
+                <a:solidFill>
+                  <a:schemeClr val="tx2">
+                    <a:lumMod val="75000"/>
+                  </a:schemeClr>
+                </a:solidFill>
+                <a:latin typeface="Courier" pitchFamily="2" charset="0"/>
+              </a:rPr>
+              <a:t>year</a:t>
+            </a:r>
+            <a:r>
+              <a:rPr lang="en-US" dirty="0">
+                <a:latin typeface="Courier" pitchFamily="2" charset="0"/>
+              </a:rPr>
+              <a:t>) {</a:t>
+            </a:r>
+          </a:p>
+          <a:p>
+            <a:pPr marL="0" indent="0">
+              <a:buNone/>
+            </a:pPr>
+            <a:r>
+              <a:rPr lang="en-US" dirty="0">
+                <a:latin typeface="Courier" pitchFamily="2" charset="0"/>
+              </a:rPr>
+              <a:t>    </a:t>
+            </a:r>
+            <a:r>
+              <a:rPr lang="en-US" dirty="0">
+                <a:solidFill>
+                  <a:srgbClr val="00B050"/>
+                </a:solidFill>
+                <a:latin typeface="Courier" pitchFamily="2" charset="0"/>
+              </a:rPr>
+              <a:t>if</a:t>
+            </a:r>
+            <a:r>
+              <a:rPr lang="en-US" dirty="0">
+                <a:latin typeface="Courier" pitchFamily="2" charset="0"/>
+              </a:rPr>
+              <a:t> (month </a:t>
+            </a:r>
+            <a:r>
+              <a:rPr lang="en-US" dirty="0">
+                <a:solidFill>
+                  <a:srgbClr val="FF0000"/>
+                </a:solidFill>
+                <a:latin typeface="Courier" pitchFamily="2" charset="0"/>
+              </a:rPr>
+              <a:t>==</a:t>
+            </a:r>
+            <a:r>
+              <a:rPr lang="en-US" dirty="0">
+                <a:latin typeface="Courier" pitchFamily="2" charset="0"/>
+              </a:rPr>
+              <a:t> 2) {</a:t>
+            </a:r>
+          </a:p>
+          <a:p>
+            <a:pPr marL="0" indent="0">
+              <a:buNone/>
+            </a:pPr>
+            <a:r>
+              <a:rPr lang="en-US" dirty="0">
+                <a:latin typeface="Courier" pitchFamily="2" charset="0"/>
+              </a:rPr>
+              <a:t>        </a:t>
+            </a:r>
+            <a:r>
+              <a:rPr lang="en-US" dirty="0" err="1">
+                <a:latin typeface="Courier" pitchFamily="2" charset="0"/>
+              </a:rPr>
+              <a:t>dayOfMonth</a:t>
+            </a:r>
+            <a:r>
+              <a:rPr lang="en-US" dirty="0">
+                <a:latin typeface="Courier" pitchFamily="2" charset="0"/>
+              </a:rPr>
+              <a:t> </a:t>
+            </a:r>
+            <a:r>
+              <a:rPr lang="en-US" dirty="0">
+                <a:solidFill>
+                  <a:srgbClr val="FF0000"/>
+                </a:solidFill>
+                <a:latin typeface="Courier" pitchFamily="2" charset="0"/>
+              </a:rPr>
+              <a:t>+=</a:t>
+            </a:r>
+            <a:r>
+              <a:rPr lang="en-US" dirty="0">
+                <a:latin typeface="Courier" pitchFamily="2" charset="0"/>
+              </a:rPr>
+              <a:t> 31;</a:t>
+            </a:r>
+          </a:p>
+          <a:p>
+            <a:pPr marL="0" indent="0">
+              <a:buNone/>
+            </a:pPr>
+            <a:r>
+              <a:rPr lang="en-US" dirty="0">
+                <a:latin typeface="Courier" pitchFamily="2" charset="0"/>
+              </a:rPr>
+              <a:t>    } </a:t>
+            </a:r>
+            <a:r>
+              <a:rPr lang="en-US" dirty="0">
+                <a:solidFill>
+                  <a:srgbClr val="00B050"/>
+                </a:solidFill>
+                <a:latin typeface="Courier" pitchFamily="2" charset="0"/>
+              </a:rPr>
+              <a:t>else if </a:t>
+            </a:r>
+            <a:r>
+              <a:rPr lang="en-US" dirty="0">
+                <a:latin typeface="Courier" pitchFamily="2" charset="0"/>
+              </a:rPr>
+              <a:t>(month == 3) {</a:t>
+            </a:r>
+          </a:p>
+          <a:p>
+            <a:pPr marL="0" indent="0">
+              <a:buNone/>
+            </a:pPr>
+            <a:r>
+              <a:rPr lang="en-US" dirty="0">
+                <a:latin typeface="Courier" pitchFamily="2" charset="0"/>
+              </a:rPr>
+              <a:t>        </a:t>
+            </a:r>
+            <a:r>
+              <a:rPr lang="en-US" dirty="0" err="1">
+                <a:latin typeface="Courier" pitchFamily="2" charset="0"/>
+              </a:rPr>
+              <a:t>dayOfMonth</a:t>
+            </a:r>
+            <a:r>
+              <a:rPr lang="en-US" dirty="0">
+                <a:latin typeface="Courier" pitchFamily="2" charset="0"/>
+              </a:rPr>
+              <a:t> </a:t>
+            </a:r>
+            <a:r>
+              <a:rPr lang="en-US" dirty="0">
+                <a:solidFill>
+                  <a:srgbClr val="FF0000"/>
+                </a:solidFill>
+                <a:latin typeface="Courier" pitchFamily="2" charset="0"/>
+              </a:rPr>
+              <a:t>+=</a:t>
+            </a:r>
+            <a:r>
+              <a:rPr lang="en-US" dirty="0">
+                <a:latin typeface="Courier" pitchFamily="2" charset="0"/>
+              </a:rPr>
+              <a:t> 59;</a:t>
+            </a:r>
+          </a:p>
+          <a:p>
+            <a:pPr marL="0" indent="0">
+              <a:buNone/>
+            </a:pPr>
+            <a:r>
+              <a:rPr lang="en-US" dirty="0">
+                <a:latin typeface="Courier" pitchFamily="2" charset="0"/>
+              </a:rPr>
+              <a:t>    } </a:t>
+            </a:r>
+            <a:r>
+              <a:rPr lang="en-US" dirty="0">
+                <a:solidFill>
+                  <a:srgbClr val="00B050"/>
+                </a:solidFill>
+                <a:latin typeface="Courier" pitchFamily="2" charset="0"/>
+              </a:rPr>
+              <a:t>else if </a:t>
+            </a:r>
+            <a:r>
+              <a:rPr lang="en-US" dirty="0">
+                <a:latin typeface="Courier" pitchFamily="2" charset="0"/>
+              </a:rPr>
+              <a:t>(month </a:t>
+            </a:r>
+            <a:r>
+              <a:rPr lang="en-US" dirty="0">
+                <a:solidFill>
+                  <a:srgbClr val="FF0000"/>
+                </a:solidFill>
+                <a:latin typeface="Courier" pitchFamily="2" charset="0"/>
+              </a:rPr>
+              <a:t>==</a:t>
+            </a:r>
+            <a:r>
+              <a:rPr lang="en-US" dirty="0">
+                <a:latin typeface="Courier" pitchFamily="2" charset="0"/>
+              </a:rPr>
+              <a:t> 4) {</a:t>
+            </a:r>
+          </a:p>
+          <a:p>
+            <a:pPr marL="0" indent="0">
+              <a:buNone/>
+            </a:pPr>
+            <a:r>
+              <a:rPr lang="en-US" dirty="0">
+                <a:latin typeface="Courier" pitchFamily="2" charset="0"/>
+              </a:rPr>
+              <a:t>        </a:t>
+            </a:r>
+            <a:r>
+              <a:rPr lang="en-US" dirty="0" err="1">
+                <a:latin typeface="Courier" pitchFamily="2" charset="0"/>
+              </a:rPr>
+              <a:t>dayOfMonth</a:t>
+            </a:r>
+            <a:r>
+              <a:rPr lang="en-US" dirty="0">
+                <a:latin typeface="Courier" pitchFamily="2" charset="0"/>
+              </a:rPr>
+              <a:t> </a:t>
+            </a:r>
+            <a:r>
+              <a:rPr lang="en-US" dirty="0">
+                <a:solidFill>
+                  <a:srgbClr val="FF0000"/>
+                </a:solidFill>
+                <a:latin typeface="Courier" pitchFamily="2" charset="0"/>
+              </a:rPr>
+              <a:t>+=</a:t>
+            </a:r>
+            <a:r>
+              <a:rPr lang="en-US" dirty="0">
+                <a:latin typeface="Courier" pitchFamily="2" charset="0"/>
+              </a:rPr>
+              <a:t> 90;</a:t>
+            </a:r>
+          </a:p>
+          <a:p>
+            <a:pPr marL="0" indent="0">
+              <a:buNone/>
+            </a:pPr>
+            <a:r>
+              <a:rPr lang="en-US" dirty="0">
+                <a:latin typeface="Courier" pitchFamily="2" charset="0"/>
+              </a:rPr>
+              <a:t>    } </a:t>
+            </a:r>
+            <a:r>
+              <a:rPr lang="en-US" dirty="0">
+                <a:solidFill>
+                  <a:srgbClr val="00B050"/>
+                </a:solidFill>
+                <a:latin typeface="Courier" pitchFamily="2" charset="0"/>
+              </a:rPr>
+              <a:t>else if </a:t>
+            </a:r>
+            <a:r>
+              <a:rPr lang="en-US" dirty="0">
+                <a:latin typeface="Courier" pitchFamily="2" charset="0"/>
+              </a:rPr>
+              <a:t>(month </a:t>
+            </a:r>
+            <a:r>
+              <a:rPr lang="en-US" dirty="0">
+                <a:solidFill>
+                  <a:srgbClr val="FF0000"/>
+                </a:solidFill>
+                <a:latin typeface="Courier" pitchFamily="2" charset="0"/>
+              </a:rPr>
+              <a:t>==</a:t>
+            </a:r>
+            <a:r>
+              <a:rPr lang="en-US" dirty="0">
+                <a:latin typeface="Courier" pitchFamily="2" charset="0"/>
+              </a:rPr>
+              <a:t> 5) {</a:t>
+            </a:r>
+          </a:p>
+          <a:p>
+            <a:pPr marL="0" indent="0">
+              <a:buNone/>
+            </a:pPr>
+            <a:r>
+              <a:rPr lang="en-US" dirty="0">
+                <a:latin typeface="Courier" pitchFamily="2" charset="0"/>
+              </a:rPr>
+              <a:t>        </a:t>
+            </a:r>
+            <a:r>
+              <a:rPr lang="en-US" dirty="0" err="1">
+                <a:latin typeface="Courier" pitchFamily="2" charset="0"/>
+              </a:rPr>
+              <a:t>dayOfMonth</a:t>
+            </a:r>
+            <a:r>
+              <a:rPr lang="en-US" dirty="0">
+                <a:latin typeface="Courier" pitchFamily="2" charset="0"/>
+              </a:rPr>
+              <a:t> </a:t>
+            </a:r>
+            <a:r>
+              <a:rPr lang="en-US" dirty="0">
+                <a:solidFill>
+                  <a:srgbClr val="FF0000"/>
+                </a:solidFill>
+                <a:latin typeface="Courier" pitchFamily="2" charset="0"/>
+              </a:rPr>
+              <a:t>+=</a:t>
+            </a:r>
+            <a:r>
+              <a:rPr lang="en-US" dirty="0">
+                <a:latin typeface="Courier" pitchFamily="2" charset="0"/>
+              </a:rPr>
+              <a:t> 31 </a:t>
+            </a:r>
+            <a:r>
+              <a:rPr lang="en-US" dirty="0">
+                <a:solidFill>
+                  <a:srgbClr val="FF0000"/>
+                </a:solidFill>
+                <a:latin typeface="Courier" pitchFamily="2" charset="0"/>
+              </a:rPr>
+              <a:t>+</a:t>
+            </a:r>
+            <a:r>
+              <a:rPr lang="en-US" dirty="0">
+                <a:latin typeface="Courier" pitchFamily="2" charset="0"/>
+              </a:rPr>
+              <a:t> 28 </a:t>
+            </a:r>
+            <a:r>
+              <a:rPr lang="en-US" dirty="0">
+                <a:solidFill>
+                  <a:srgbClr val="FF0000"/>
+                </a:solidFill>
+                <a:latin typeface="Courier" pitchFamily="2" charset="0"/>
+              </a:rPr>
+              <a:t>+</a:t>
+            </a:r>
+            <a:r>
+              <a:rPr lang="en-US" dirty="0">
+                <a:latin typeface="Courier" pitchFamily="2" charset="0"/>
+              </a:rPr>
+              <a:t> 31 </a:t>
+            </a:r>
+            <a:r>
+              <a:rPr lang="en-US" dirty="0">
+                <a:solidFill>
+                  <a:srgbClr val="FF0000"/>
+                </a:solidFill>
+                <a:latin typeface="Courier" pitchFamily="2" charset="0"/>
+              </a:rPr>
+              <a:t>+</a:t>
+            </a:r>
+            <a:r>
+              <a:rPr lang="en-US" dirty="0">
+                <a:latin typeface="Courier" pitchFamily="2" charset="0"/>
+              </a:rPr>
+              <a:t> 30;</a:t>
+            </a:r>
+          </a:p>
+          <a:p>
+            <a:pPr marL="0" indent="0">
+              <a:buNone/>
+            </a:pPr>
+            <a:r>
+              <a:rPr lang="en-US" dirty="0">
+                <a:latin typeface="Courier" pitchFamily="2" charset="0"/>
+              </a:rPr>
+              <a:t>    } </a:t>
+            </a:r>
+            <a:r>
+              <a:rPr lang="en-US" dirty="0">
+                <a:solidFill>
+                  <a:srgbClr val="00B050"/>
+                </a:solidFill>
+                <a:latin typeface="Courier" pitchFamily="2" charset="0"/>
+              </a:rPr>
+              <a:t>else if </a:t>
+            </a:r>
+            <a:r>
+              <a:rPr lang="en-US" dirty="0">
+                <a:latin typeface="Courier" pitchFamily="2" charset="0"/>
+              </a:rPr>
+              <a:t>(month </a:t>
+            </a:r>
+            <a:r>
+              <a:rPr lang="en-US" dirty="0">
+                <a:solidFill>
+                  <a:srgbClr val="FF0000"/>
+                </a:solidFill>
+                <a:latin typeface="Courier" pitchFamily="2" charset="0"/>
+              </a:rPr>
+              <a:t>==</a:t>
+            </a:r>
+            <a:r>
+              <a:rPr lang="en-US" dirty="0">
+                <a:latin typeface="Courier" pitchFamily="2" charset="0"/>
+              </a:rPr>
+              <a:t> 6) {</a:t>
+            </a:r>
+          </a:p>
+          <a:p>
+            <a:pPr marL="0" indent="0">
+              <a:buNone/>
+            </a:pPr>
+            <a:r>
+              <a:rPr lang="en-US" dirty="0">
+                <a:latin typeface="Courier" pitchFamily="2" charset="0"/>
+              </a:rPr>
+              <a:t>        </a:t>
+            </a:r>
+            <a:r>
+              <a:rPr lang="en-US" dirty="0" err="1">
+                <a:latin typeface="Courier" pitchFamily="2" charset="0"/>
+              </a:rPr>
+              <a:t>dayOfMonth</a:t>
+            </a:r>
+            <a:r>
+              <a:rPr lang="en-US" dirty="0">
+                <a:latin typeface="Courier" pitchFamily="2" charset="0"/>
+              </a:rPr>
+              <a:t> </a:t>
+            </a:r>
+            <a:r>
+              <a:rPr lang="en-US" dirty="0">
+                <a:solidFill>
+                  <a:srgbClr val="FF0000"/>
+                </a:solidFill>
+                <a:latin typeface="Courier" pitchFamily="2" charset="0"/>
+              </a:rPr>
+              <a:t>+=</a:t>
+            </a:r>
+            <a:r>
+              <a:rPr lang="en-US" dirty="0">
+                <a:latin typeface="Courier" pitchFamily="2" charset="0"/>
+              </a:rPr>
+              <a:t> 31 </a:t>
+            </a:r>
+            <a:r>
+              <a:rPr lang="en-US" dirty="0">
+                <a:solidFill>
+                  <a:srgbClr val="FF0000"/>
+                </a:solidFill>
+                <a:latin typeface="Courier" pitchFamily="2" charset="0"/>
+              </a:rPr>
+              <a:t>+</a:t>
+            </a:r>
+            <a:r>
+              <a:rPr lang="en-US" dirty="0">
+                <a:latin typeface="Courier" pitchFamily="2" charset="0"/>
+              </a:rPr>
+              <a:t> 28 </a:t>
+            </a:r>
+            <a:r>
+              <a:rPr lang="en-US" dirty="0">
+                <a:solidFill>
+                  <a:srgbClr val="FF0000"/>
+                </a:solidFill>
+                <a:latin typeface="Courier" pitchFamily="2" charset="0"/>
+              </a:rPr>
+              <a:t>+</a:t>
+            </a:r>
+            <a:r>
+              <a:rPr lang="en-US" dirty="0">
+                <a:latin typeface="Courier" pitchFamily="2" charset="0"/>
+              </a:rPr>
+              <a:t> 31 </a:t>
+            </a:r>
+            <a:r>
+              <a:rPr lang="en-US" dirty="0">
+                <a:solidFill>
+                  <a:srgbClr val="FF0000"/>
+                </a:solidFill>
+                <a:latin typeface="Courier" pitchFamily="2" charset="0"/>
+              </a:rPr>
+              <a:t>+</a:t>
+            </a:r>
+            <a:r>
+              <a:rPr lang="en-US" dirty="0">
+                <a:latin typeface="Courier" pitchFamily="2" charset="0"/>
+              </a:rPr>
+              <a:t> 30 </a:t>
+            </a:r>
+            <a:r>
+              <a:rPr lang="en-US" dirty="0">
+                <a:solidFill>
+                  <a:srgbClr val="FF0000"/>
+                </a:solidFill>
+                <a:latin typeface="Courier" pitchFamily="2" charset="0"/>
+              </a:rPr>
+              <a:t>+</a:t>
+            </a:r>
+            <a:r>
+              <a:rPr lang="en-US" dirty="0">
+                <a:latin typeface="Courier" pitchFamily="2" charset="0"/>
+              </a:rPr>
+              <a:t> 31;</a:t>
+            </a:r>
+          </a:p>
+          <a:p>
+            <a:pPr marL="0" indent="0">
+              <a:buNone/>
+            </a:pPr>
+            <a:r>
+              <a:rPr lang="en-US" dirty="0">
+                <a:latin typeface="Courier" pitchFamily="2" charset="0"/>
+              </a:rPr>
+              <a:t>    } </a:t>
+            </a:r>
+            <a:r>
+              <a:rPr lang="en-US" dirty="0">
+                <a:solidFill>
+                  <a:srgbClr val="00B050"/>
+                </a:solidFill>
+                <a:latin typeface="Courier" pitchFamily="2" charset="0"/>
+              </a:rPr>
+              <a:t>else if </a:t>
+            </a:r>
+            <a:r>
+              <a:rPr lang="en-US" dirty="0">
+                <a:latin typeface="Courier" pitchFamily="2" charset="0"/>
+              </a:rPr>
+              <a:t>(month </a:t>
+            </a:r>
+            <a:r>
+              <a:rPr lang="en-US" dirty="0">
+                <a:solidFill>
+                  <a:srgbClr val="FF0000"/>
+                </a:solidFill>
+                <a:latin typeface="Courier" pitchFamily="2" charset="0"/>
+              </a:rPr>
+              <a:t>==</a:t>
+            </a:r>
+            <a:r>
+              <a:rPr lang="en-US" dirty="0">
+                <a:latin typeface="Courier" pitchFamily="2" charset="0"/>
+              </a:rPr>
+              <a:t> 7) {</a:t>
+            </a:r>
+          </a:p>
+          <a:p>
+            <a:pPr marL="0" indent="0">
+              <a:buNone/>
+            </a:pPr>
+            <a:r>
+              <a:rPr lang="en-US" dirty="0">
+                <a:latin typeface="Courier" pitchFamily="2" charset="0"/>
+              </a:rPr>
+              <a:t>        </a:t>
+            </a:r>
+            <a:r>
+              <a:rPr lang="en-US" dirty="0" err="1">
+                <a:latin typeface="Courier" pitchFamily="2" charset="0"/>
+              </a:rPr>
+              <a:t>dayOfMonth</a:t>
+            </a:r>
+            <a:r>
+              <a:rPr lang="en-US" dirty="0">
+                <a:latin typeface="Courier" pitchFamily="2" charset="0"/>
+              </a:rPr>
+              <a:t> </a:t>
+            </a:r>
+            <a:r>
+              <a:rPr lang="en-US" dirty="0">
+                <a:solidFill>
+                  <a:srgbClr val="FF0000"/>
+                </a:solidFill>
+                <a:latin typeface="Courier" pitchFamily="2" charset="0"/>
+              </a:rPr>
+              <a:t>+=</a:t>
+            </a:r>
+            <a:r>
+              <a:rPr lang="en-US" dirty="0">
+                <a:latin typeface="Courier" pitchFamily="2" charset="0"/>
+              </a:rPr>
+              <a:t> 31 </a:t>
+            </a:r>
+            <a:r>
+              <a:rPr lang="en-US" dirty="0">
+                <a:solidFill>
+                  <a:srgbClr val="FF0000"/>
+                </a:solidFill>
+                <a:latin typeface="Courier" pitchFamily="2" charset="0"/>
+              </a:rPr>
+              <a:t>+</a:t>
+            </a:r>
+            <a:r>
+              <a:rPr lang="en-US" dirty="0">
+                <a:latin typeface="Courier" pitchFamily="2" charset="0"/>
+              </a:rPr>
+              <a:t> 28 </a:t>
+            </a:r>
+            <a:r>
+              <a:rPr lang="en-US" dirty="0">
+                <a:solidFill>
+                  <a:srgbClr val="FF0000"/>
+                </a:solidFill>
+                <a:latin typeface="Courier" pitchFamily="2" charset="0"/>
+              </a:rPr>
+              <a:t>+</a:t>
+            </a:r>
+            <a:r>
+              <a:rPr lang="en-US" dirty="0">
+                <a:latin typeface="Courier" pitchFamily="2" charset="0"/>
+              </a:rPr>
+              <a:t> 31 </a:t>
+            </a:r>
+            <a:r>
+              <a:rPr lang="en-US" dirty="0">
+                <a:solidFill>
+                  <a:srgbClr val="FF0000"/>
+                </a:solidFill>
+                <a:latin typeface="Courier" pitchFamily="2" charset="0"/>
+              </a:rPr>
+              <a:t>+</a:t>
+            </a:r>
+            <a:r>
+              <a:rPr lang="en-US" dirty="0">
+                <a:latin typeface="Courier" pitchFamily="2" charset="0"/>
+              </a:rPr>
+              <a:t> 30 </a:t>
+            </a:r>
+            <a:r>
+              <a:rPr lang="en-US" dirty="0">
+                <a:solidFill>
+                  <a:srgbClr val="FF0000"/>
+                </a:solidFill>
+                <a:latin typeface="Courier" pitchFamily="2" charset="0"/>
+              </a:rPr>
+              <a:t>+</a:t>
+            </a:r>
+            <a:r>
+              <a:rPr lang="en-US" dirty="0">
+                <a:latin typeface="Courier" pitchFamily="2" charset="0"/>
+              </a:rPr>
+              <a:t> 31 </a:t>
+            </a:r>
+            <a:r>
+              <a:rPr lang="en-US" dirty="0">
+                <a:solidFill>
+                  <a:srgbClr val="FF0000"/>
+                </a:solidFill>
+                <a:latin typeface="Courier" pitchFamily="2" charset="0"/>
+              </a:rPr>
+              <a:t>+</a:t>
+            </a:r>
+            <a:r>
+              <a:rPr lang="en-US" dirty="0">
+                <a:latin typeface="Courier" pitchFamily="2" charset="0"/>
+              </a:rPr>
+              <a:t> 30;</a:t>
+            </a:r>
+          </a:p>
+          <a:p>
+            <a:pPr marL="0" indent="0">
+              <a:buNone/>
+            </a:pPr>
+            <a:r>
+              <a:rPr lang="en-US" dirty="0">
+                <a:latin typeface="Courier" pitchFamily="2" charset="0"/>
+              </a:rPr>
+              <a:t>    } </a:t>
+            </a:r>
+            <a:r>
+              <a:rPr lang="en-US" dirty="0">
+                <a:solidFill>
+                  <a:srgbClr val="00B050"/>
+                </a:solidFill>
+                <a:latin typeface="Courier" pitchFamily="2" charset="0"/>
+              </a:rPr>
+              <a:t>else if </a:t>
+            </a:r>
+            <a:r>
+              <a:rPr lang="en-US" dirty="0">
+                <a:latin typeface="Courier" pitchFamily="2" charset="0"/>
+              </a:rPr>
+              <a:t>(month </a:t>
+            </a:r>
+            <a:r>
+              <a:rPr lang="en-US" dirty="0">
+                <a:solidFill>
+                  <a:srgbClr val="FF0000"/>
+                </a:solidFill>
+                <a:latin typeface="Courier" pitchFamily="2" charset="0"/>
+              </a:rPr>
+              <a:t>==</a:t>
+            </a:r>
+            <a:r>
+              <a:rPr lang="en-US" dirty="0">
+                <a:latin typeface="Courier" pitchFamily="2" charset="0"/>
+              </a:rPr>
+              <a:t> 8) {</a:t>
+            </a:r>
+          </a:p>
+          <a:p>
+            <a:pPr marL="0" indent="0">
+              <a:buNone/>
+            </a:pPr>
+            <a:r>
+              <a:rPr lang="en-US" dirty="0">
+                <a:latin typeface="Courier" pitchFamily="2" charset="0"/>
+              </a:rPr>
+              <a:t>        </a:t>
+            </a:r>
+            <a:r>
+              <a:rPr lang="en-US" dirty="0" err="1">
+                <a:latin typeface="Courier" pitchFamily="2" charset="0"/>
+              </a:rPr>
+              <a:t>dayOfMonth</a:t>
+            </a:r>
+            <a:r>
+              <a:rPr lang="en-US" dirty="0">
+                <a:latin typeface="Courier" pitchFamily="2" charset="0"/>
+              </a:rPr>
+              <a:t> </a:t>
+            </a:r>
+            <a:r>
+              <a:rPr lang="en-US" dirty="0">
+                <a:solidFill>
+                  <a:srgbClr val="FF0000"/>
+                </a:solidFill>
+                <a:latin typeface="Courier" pitchFamily="2" charset="0"/>
+              </a:rPr>
+              <a:t>+=</a:t>
+            </a:r>
+            <a:r>
+              <a:rPr lang="en-US" dirty="0">
+                <a:latin typeface="Courier" pitchFamily="2" charset="0"/>
+              </a:rPr>
+              <a:t> 31 </a:t>
+            </a:r>
+            <a:r>
+              <a:rPr lang="en-US" dirty="0">
+                <a:solidFill>
+                  <a:srgbClr val="FF0000"/>
+                </a:solidFill>
+                <a:latin typeface="Courier" pitchFamily="2" charset="0"/>
+              </a:rPr>
+              <a:t>+</a:t>
+            </a:r>
+            <a:r>
+              <a:rPr lang="en-US" dirty="0">
+                <a:latin typeface="Courier" pitchFamily="2" charset="0"/>
+              </a:rPr>
+              <a:t> 28 </a:t>
+            </a:r>
+            <a:r>
+              <a:rPr lang="en-US" dirty="0">
+                <a:solidFill>
+                  <a:srgbClr val="FF0000"/>
+                </a:solidFill>
+                <a:latin typeface="Courier" pitchFamily="2" charset="0"/>
+              </a:rPr>
+              <a:t>+</a:t>
+            </a:r>
+            <a:r>
+              <a:rPr lang="en-US" dirty="0">
+                <a:latin typeface="Courier" pitchFamily="2" charset="0"/>
+              </a:rPr>
+              <a:t> 31 </a:t>
+            </a:r>
+            <a:r>
+              <a:rPr lang="en-US" dirty="0">
+                <a:solidFill>
+                  <a:srgbClr val="FF0000"/>
+                </a:solidFill>
+                <a:latin typeface="Courier" pitchFamily="2" charset="0"/>
+              </a:rPr>
+              <a:t>+</a:t>
+            </a:r>
+            <a:r>
+              <a:rPr lang="en-US" dirty="0">
+                <a:latin typeface="Courier" pitchFamily="2" charset="0"/>
+              </a:rPr>
+              <a:t> 30 </a:t>
+            </a:r>
+            <a:r>
+              <a:rPr lang="en-US" dirty="0">
+                <a:solidFill>
+                  <a:srgbClr val="FF0000"/>
+                </a:solidFill>
+                <a:latin typeface="Courier" pitchFamily="2" charset="0"/>
+              </a:rPr>
+              <a:t>+</a:t>
+            </a:r>
+            <a:r>
+              <a:rPr lang="en-US" dirty="0">
+                <a:latin typeface="Courier" pitchFamily="2" charset="0"/>
+              </a:rPr>
+              <a:t> 31 </a:t>
+            </a:r>
+            <a:r>
+              <a:rPr lang="en-US" dirty="0">
+                <a:solidFill>
+                  <a:srgbClr val="FF0000"/>
+                </a:solidFill>
+                <a:latin typeface="Courier" pitchFamily="2" charset="0"/>
+              </a:rPr>
+              <a:t>+</a:t>
+            </a:r>
+            <a:r>
+              <a:rPr lang="en-US" dirty="0">
+                <a:latin typeface="Courier" pitchFamily="2" charset="0"/>
+              </a:rPr>
+              <a:t> 30 </a:t>
+            </a:r>
+            <a:r>
+              <a:rPr lang="en-US" dirty="0">
+                <a:solidFill>
+                  <a:srgbClr val="FF0000"/>
+                </a:solidFill>
+                <a:latin typeface="Courier" pitchFamily="2" charset="0"/>
+              </a:rPr>
+              <a:t>+</a:t>
+            </a:r>
+            <a:r>
+              <a:rPr lang="en-US" dirty="0">
+                <a:latin typeface="Courier" pitchFamily="2" charset="0"/>
+              </a:rPr>
+              <a:t> 31;</a:t>
+            </a:r>
+          </a:p>
+          <a:p>
+            <a:pPr marL="0" indent="0">
+              <a:buNone/>
+            </a:pPr>
+            <a:r>
+              <a:rPr lang="en-US" dirty="0">
+                <a:latin typeface="Courier" pitchFamily="2" charset="0"/>
+              </a:rPr>
+              <a:t>    } </a:t>
+            </a:r>
+            <a:r>
+              <a:rPr lang="en-US" dirty="0">
+                <a:solidFill>
+                  <a:srgbClr val="00B050"/>
+                </a:solidFill>
+                <a:latin typeface="Courier" pitchFamily="2" charset="0"/>
+              </a:rPr>
+              <a:t>else if </a:t>
+            </a:r>
+            <a:r>
+              <a:rPr lang="en-US" dirty="0">
+                <a:latin typeface="Courier" pitchFamily="2" charset="0"/>
+              </a:rPr>
+              <a:t>(month </a:t>
+            </a:r>
+            <a:r>
+              <a:rPr lang="en-US" dirty="0">
+                <a:solidFill>
+                  <a:srgbClr val="FF0000"/>
+                </a:solidFill>
+                <a:latin typeface="Courier" pitchFamily="2" charset="0"/>
+              </a:rPr>
+              <a:t>==</a:t>
+            </a:r>
+            <a:r>
+              <a:rPr lang="en-US" dirty="0">
+                <a:latin typeface="Courier" pitchFamily="2" charset="0"/>
+              </a:rPr>
+              <a:t> 9) {</a:t>
+            </a:r>
+          </a:p>
+          <a:p>
+            <a:pPr marL="0" indent="0">
+              <a:buNone/>
+            </a:pPr>
+            <a:r>
+              <a:rPr lang="en-US" dirty="0">
+                <a:latin typeface="Courier" pitchFamily="2" charset="0"/>
+              </a:rPr>
+              <a:t>        </a:t>
+            </a:r>
+            <a:r>
+              <a:rPr lang="en-US" dirty="0" err="1">
+                <a:latin typeface="Courier" pitchFamily="2" charset="0"/>
+              </a:rPr>
+              <a:t>dayOfMonth</a:t>
+            </a:r>
+            <a:r>
+              <a:rPr lang="en-US" dirty="0">
+                <a:latin typeface="Courier" pitchFamily="2" charset="0"/>
+              </a:rPr>
+              <a:t> </a:t>
+            </a:r>
+            <a:r>
+              <a:rPr lang="en-US" dirty="0">
+                <a:solidFill>
+                  <a:srgbClr val="FF0000"/>
+                </a:solidFill>
+                <a:latin typeface="Courier" pitchFamily="2" charset="0"/>
+              </a:rPr>
+              <a:t>+=</a:t>
+            </a:r>
+            <a:r>
+              <a:rPr lang="en-US" dirty="0">
+                <a:latin typeface="Courier" pitchFamily="2" charset="0"/>
+              </a:rPr>
+              <a:t> 31 </a:t>
+            </a:r>
+            <a:r>
+              <a:rPr lang="en-US" dirty="0">
+                <a:solidFill>
+                  <a:srgbClr val="FF0000"/>
+                </a:solidFill>
+                <a:latin typeface="Courier" pitchFamily="2" charset="0"/>
+              </a:rPr>
+              <a:t>+</a:t>
+            </a:r>
+            <a:r>
+              <a:rPr lang="en-US" dirty="0">
+                <a:latin typeface="Courier" pitchFamily="2" charset="0"/>
+              </a:rPr>
+              <a:t> 28 </a:t>
+            </a:r>
+            <a:r>
+              <a:rPr lang="en-US" dirty="0">
+                <a:solidFill>
+                  <a:srgbClr val="FF0000"/>
+                </a:solidFill>
+                <a:latin typeface="Courier" pitchFamily="2" charset="0"/>
+              </a:rPr>
+              <a:t>+</a:t>
+            </a:r>
+            <a:r>
+              <a:rPr lang="en-US" dirty="0">
+                <a:latin typeface="Courier" pitchFamily="2" charset="0"/>
+              </a:rPr>
+              <a:t> 31 </a:t>
+            </a:r>
+            <a:r>
+              <a:rPr lang="en-US" dirty="0">
+                <a:solidFill>
+                  <a:srgbClr val="FF0000"/>
+                </a:solidFill>
+                <a:latin typeface="Courier" pitchFamily="2" charset="0"/>
+              </a:rPr>
+              <a:t>+</a:t>
+            </a:r>
+            <a:r>
+              <a:rPr lang="en-US" dirty="0">
+                <a:latin typeface="Courier" pitchFamily="2" charset="0"/>
+              </a:rPr>
+              <a:t> 30 </a:t>
+            </a:r>
+            <a:r>
+              <a:rPr lang="en-US" dirty="0">
+                <a:solidFill>
+                  <a:srgbClr val="FF0000"/>
+                </a:solidFill>
+                <a:latin typeface="Courier" pitchFamily="2" charset="0"/>
+              </a:rPr>
+              <a:t>+</a:t>
+            </a:r>
+            <a:r>
+              <a:rPr lang="en-US" dirty="0">
+                <a:latin typeface="Courier" pitchFamily="2" charset="0"/>
+              </a:rPr>
+              <a:t> 31 </a:t>
+            </a:r>
+            <a:r>
+              <a:rPr lang="en-US" dirty="0">
+                <a:solidFill>
+                  <a:srgbClr val="FF0000"/>
+                </a:solidFill>
+                <a:latin typeface="Courier" pitchFamily="2" charset="0"/>
+              </a:rPr>
+              <a:t>+</a:t>
+            </a:r>
+            <a:r>
+              <a:rPr lang="en-US" dirty="0">
+                <a:latin typeface="Courier" pitchFamily="2" charset="0"/>
+              </a:rPr>
+              <a:t> 30 </a:t>
+            </a:r>
+            <a:r>
+              <a:rPr lang="en-US" dirty="0">
+                <a:solidFill>
+                  <a:srgbClr val="FF0000"/>
+                </a:solidFill>
+                <a:latin typeface="Courier" pitchFamily="2" charset="0"/>
+              </a:rPr>
+              <a:t>+</a:t>
+            </a:r>
+            <a:r>
+              <a:rPr lang="en-US" dirty="0">
+                <a:latin typeface="Courier" pitchFamily="2" charset="0"/>
+              </a:rPr>
+              <a:t> 31 </a:t>
+            </a:r>
+            <a:r>
+              <a:rPr lang="en-US" dirty="0">
+                <a:solidFill>
+                  <a:srgbClr val="FF0000"/>
+                </a:solidFill>
+                <a:latin typeface="Courier" pitchFamily="2" charset="0"/>
+              </a:rPr>
+              <a:t>+</a:t>
+            </a:r>
+            <a:r>
+              <a:rPr lang="en-US" dirty="0">
+                <a:latin typeface="Courier" pitchFamily="2" charset="0"/>
+              </a:rPr>
+              <a:t> 31;</a:t>
+            </a:r>
+          </a:p>
+          <a:p>
+            <a:pPr marL="0" indent="0">
+              <a:buNone/>
+            </a:pPr>
+            <a:r>
+              <a:rPr lang="en-US" dirty="0">
+                <a:latin typeface="Courier" pitchFamily="2" charset="0"/>
+              </a:rPr>
+              <a:t>    } </a:t>
+            </a:r>
+            <a:r>
+              <a:rPr lang="en-US" dirty="0">
+                <a:solidFill>
+                  <a:srgbClr val="00B050"/>
+                </a:solidFill>
+                <a:latin typeface="Courier" pitchFamily="2" charset="0"/>
+              </a:rPr>
+              <a:t>else if </a:t>
+            </a:r>
+            <a:r>
+              <a:rPr lang="en-US" dirty="0">
+                <a:latin typeface="Courier" pitchFamily="2" charset="0"/>
+              </a:rPr>
+              <a:t>(month </a:t>
+            </a:r>
+            <a:r>
+              <a:rPr lang="en-US" dirty="0">
+                <a:solidFill>
+                  <a:srgbClr val="FF0000"/>
+                </a:solidFill>
+                <a:latin typeface="Courier" pitchFamily="2" charset="0"/>
+              </a:rPr>
+              <a:t>==</a:t>
+            </a:r>
+            <a:r>
+              <a:rPr lang="en-US" dirty="0">
+                <a:latin typeface="Courier" pitchFamily="2" charset="0"/>
+              </a:rPr>
+              <a:t> 10) {</a:t>
+            </a:r>
+          </a:p>
+          <a:p>
+            <a:pPr marL="0" indent="0">
+              <a:buNone/>
+            </a:pPr>
+            <a:r>
+              <a:rPr lang="en-US" dirty="0">
+                <a:latin typeface="Courier" pitchFamily="2" charset="0"/>
+              </a:rPr>
+              <a:t>        </a:t>
+            </a:r>
+            <a:r>
+              <a:rPr lang="en-US" dirty="0" err="1">
+                <a:latin typeface="Courier" pitchFamily="2" charset="0"/>
+              </a:rPr>
+              <a:t>dayOfMonth</a:t>
+            </a:r>
+            <a:r>
+              <a:rPr lang="en-US" dirty="0">
+                <a:latin typeface="Courier" pitchFamily="2" charset="0"/>
+              </a:rPr>
+              <a:t> </a:t>
+            </a:r>
+            <a:r>
+              <a:rPr lang="en-US" dirty="0">
+                <a:solidFill>
+                  <a:srgbClr val="FF0000"/>
+                </a:solidFill>
+                <a:latin typeface="Courier" pitchFamily="2" charset="0"/>
+              </a:rPr>
+              <a:t>+=</a:t>
+            </a:r>
+            <a:r>
+              <a:rPr lang="en-US" dirty="0">
+                <a:latin typeface="Courier" pitchFamily="2" charset="0"/>
+              </a:rPr>
+              <a:t> 31 </a:t>
+            </a:r>
+            <a:r>
+              <a:rPr lang="en-US" dirty="0">
+                <a:solidFill>
+                  <a:srgbClr val="FF0000"/>
+                </a:solidFill>
+                <a:latin typeface="Courier" pitchFamily="2" charset="0"/>
+              </a:rPr>
+              <a:t>+</a:t>
+            </a:r>
+            <a:r>
+              <a:rPr lang="en-US" dirty="0">
+                <a:latin typeface="Courier" pitchFamily="2" charset="0"/>
+              </a:rPr>
+              <a:t> 28 </a:t>
+            </a:r>
+            <a:r>
+              <a:rPr lang="en-US" dirty="0">
+                <a:solidFill>
+                  <a:srgbClr val="FF0000"/>
+                </a:solidFill>
+                <a:latin typeface="Courier" pitchFamily="2" charset="0"/>
+              </a:rPr>
+              <a:t>+</a:t>
+            </a:r>
+            <a:r>
+              <a:rPr lang="en-US" dirty="0">
+                <a:latin typeface="Courier" pitchFamily="2" charset="0"/>
+              </a:rPr>
+              <a:t> 31 </a:t>
+            </a:r>
+            <a:r>
+              <a:rPr lang="en-US" dirty="0">
+                <a:solidFill>
+                  <a:srgbClr val="FF0000"/>
+                </a:solidFill>
+                <a:latin typeface="Courier" pitchFamily="2" charset="0"/>
+              </a:rPr>
+              <a:t>+</a:t>
+            </a:r>
+            <a:r>
+              <a:rPr lang="en-US" dirty="0">
+                <a:latin typeface="Courier" pitchFamily="2" charset="0"/>
+              </a:rPr>
+              <a:t> 30 </a:t>
+            </a:r>
+            <a:r>
+              <a:rPr lang="en-US" dirty="0">
+                <a:solidFill>
+                  <a:srgbClr val="FF0000"/>
+                </a:solidFill>
+                <a:latin typeface="Courier" pitchFamily="2" charset="0"/>
+              </a:rPr>
+              <a:t>+</a:t>
+            </a:r>
+            <a:r>
+              <a:rPr lang="en-US" dirty="0">
+                <a:latin typeface="Courier" pitchFamily="2" charset="0"/>
+              </a:rPr>
+              <a:t> 31 </a:t>
+            </a:r>
+            <a:r>
+              <a:rPr lang="en-US" dirty="0">
+                <a:solidFill>
+                  <a:srgbClr val="FF0000"/>
+                </a:solidFill>
+                <a:latin typeface="Courier" pitchFamily="2" charset="0"/>
+              </a:rPr>
+              <a:t>+</a:t>
+            </a:r>
+            <a:r>
+              <a:rPr lang="en-US" dirty="0">
+                <a:latin typeface="Courier" pitchFamily="2" charset="0"/>
+              </a:rPr>
+              <a:t> 30 </a:t>
+            </a:r>
+            <a:r>
+              <a:rPr lang="en-US" dirty="0">
+                <a:solidFill>
+                  <a:srgbClr val="FF0000"/>
+                </a:solidFill>
+                <a:latin typeface="Courier" pitchFamily="2" charset="0"/>
+              </a:rPr>
+              <a:t>+</a:t>
+            </a:r>
+            <a:r>
+              <a:rPr lang="en-US" dirty="0">
+                <a:latin typeface="Courier" pitchFamily="2" charset="0"/>
+              </a:rPr>
+              <a:t> 31 </a:t>
+            </a:r>
+            <a:r>
+              <a:rPr lang="en-US" dirty="0">
+                <a:solidFill>
+                  <a:srgbClr val="FF0000"/>
+                </a:solidFill>
+                <a:latin typeface="Courier" pitchFamily="2" charset="0"/>
+              </a:rPr>
+              <a:t>+</a:t>
+            </a:r>
+            <a:r>
+              <a:rPr lang="en-US" dirty="0">
+                <a:latin typeface="Courier" pitchFamily="2" charset="0"/>
+              </a:rPr>
+              <a:t> 31 </a:t>
+            </a:r>
+            <a:r>
+              <a:rPr lang="en-US" dirty="0">
+                <a:solidFill>
+                  <a:srgbClr val="FF0000"/>
+                </a:solidFill>
+                <a:latin typeface="Courier" pitchFamily="2" charset="0"/>
+              </a:rPr>
+              <a:t>+</a:t>
+            </a:r>
+            <a:r>
+              <a:rPr lang="en-US" dirty="0">
+                <a:latin typeface="Courier" pitchFamily="2" charset="0"/>
+              </a:rPr>
+              <a:t> 30;</a:t>
+            </a:r>
+          </a:p>
+          <a:p>
+            <a:pPr marL="0" indent="0">
+              <a:buNone/>
+            </a:pPr>
+            <a:r>
+              <a:rPr lang="en-US" dirty="0">
+                <a:latin typeface="Courier" pitchFamily="2" charset="0"/>
+              </a:rPr>
+              <a:t>    } </a:t>
+            </a:r>
+            <a:r>
+              <a:rPr lang="en-US" dirty="0">
+                <a:solidFill>
+                  <a:srgbClr val="00B050"/>
+                </a:solidFill>
+                <a:latin typeface="Courier" pitchFamily="2" charset="0"/>
+              </a:rPr>
+              <a:t>else if </a:t>
+            </a:r>
+            <a:r>
+              <a:rPr lang="en-US" dirty="0">
+                <a:latin typeface="Courier" pitchFamily="2" charset="0"/>
+              </a:rPr>
+              <a:t>(month </a:t>
+            </a:r>
+            <a:r>
+              <a:rPr lang="en-US" dirty="0">
+                <a:solidFill>
+                  <a:srgbClr val="FF0000"/>
+                </a:solidFill>
+                <a:latin typeface="Courier" pitchFamily="2" charset="0"/>
+              </a:rPr>
+              <a:t>==</a:t>
+            </a:r>
+            <a:r>
+              <a:rPr lang="en-US" dirty="0">
+                <a:latin typeface="Courier" pitchFamily="2" charset="0"/>
+              </a:rPr>
+              <a:t> 11) {</a:t>
+            </a:r>
+          </a:p>
+          <a:p>
+            <a:pPr marL="0" indent="0">
+              <a:buNone/>
+            </a:pPr>
+            <a:r>
+              <a:rPr lang="en-US" dirty="0">
+                <a:latin typeface="Courier" pitchFamily="2" charset="0"/>
+              </a:rPr>
+              <a:t>        </a:t>
+            </a:r>
+            <a:r>
+              <a:rPr lang="en-US" dirty="0" err="1">
+                <a:latin typeface="Courier" pitchFamily="2" charset="0"/>
+              </a:rPr>
+              <a:t>dayOfMonth</a:t>
+            </a:r>
+            <a:r>
+              <a:rPr lang="en-US" dirty="0">
+                <a:latin typeface="Courier" pitchFamily="2" charset="0"/>
+              </a:rPr>
+              <a:t> </a:t>
+            </a:r>
+            <a:r>
+              <a:rPr lang="en-US" dirty="0">
+                <a:solidFill>
+                  <a:srgbClr val="FF0000"/>
+                </a:solidFill>
+                <a:latin typeface="Courier" pitchFamily="2" charset="0"/>
+              </a:rPr>
+              <a:t>+=</a:t>
+            </a:r>
+            <a:r>
+              <a:rPr lang="en-US" dirty="0">
+                <a:latin typeface="Courier" pitchFamily="2" charset="0"/>
+              </a:rPr>
+              <a:t> 31 </a:t>
+            </a:r>
+            <a:r>
+              <a:rPr lang="en-US" dirty="0">
+                <a:solidFill>
+                  <a:srgbClr val="FF0000"/>
+                </a:solidFill>
+                <a:latin typeface="Courier" pitchFamily="2" charset="0"/>
+              </a:rPr>
+              <a:t>+</a:t>
+            </a:r>
+            <a:r>
+              <a:rPr lang="en-US" dirty="0">
+                <a:latin typeface="Courier" pitchFamily="2" charset="0"/>
+              </a:rPr>
+              <a:t> 28 </a:t>
+            </a:r>
+            <a:r>
+              <a:rPr lang="en-US" dirty="0">
+                <a:solidFill>
+                  <a:srgbClr val="FF0000"/>
+                </a:solidFill>
+                <a:latin typeface="Courier" pitchFamily="2" charset="0"/>
+              </a:rPr>
+              <a:t>+</a:t>
+            </a:r>
+            <a:r>
+              <a:rPr lang="en-US" dirty="0">
+                <a:latin typeface="Courier" pitchFamily="2" charset="0"/>
+              </a:rPr>
+              <a:t> 31 </a:t>
+            </a:r>
+            <a:r>
+              <a:rPr lang="en-US" dirty="0">
+                <a:solidFill>
+                  <a:srgbClr val="FF0000"/>
+                </a:solidFill>
+                <a:latin typeface="Courier" pitchFamily="2" charset="0"/>
+              </a:rPr>
+              <a:t>+</a:t>
+            </a:r>
+            <a:r>
+              <a:rPr lang="en-US" dirty="0">
+                <a:latin typeface="Courier" pitchFamily="2" charset="0"/>
+              </a:rPr>
+              <a:t> 30 </a:t>
+            </a:r>
+            <a:r>
+              <a:rPr lang="en-US" dirty="0">
+                <a:solidFill>
+                  <a:srgbClr val="FF0000"/>
+                </a:solidFill>
+                <a:latin typeface="Courier" pitchFamily="2" charset="0"/>
+              </a:rPr>
+              <a:t>+</a:t>
+            </a:r>
+            <a:r>
+              <a:rPr lang="en-US" dirty="0">
+                <a:latin typeface="Courier" pitchFamily="2" charset="0"/>
+              </a:rPr>
+              <a:t> 31 </a:t>
+            </a:r>
+            <a:r>
+              <a:rPr lang="en-US" dirty="0">
+                <a:solidFill>
+                  <a:srgbClr val="FF0000"/>
+                </a:solidFill>
+                <a:latin typeface="Courier" pitchFamily="2" charset="0"/>
+              </a:rPr>
+              <a:t>+</a:t>
+            </a:r>
+            <a:r>
+              <a:rPr lang="en-US" dirty="0">
+                <a:latin typeface="Courier" pitchFamily="2" charset="0"/>
+              </a:rPr>
+              <a:t> 30 </a:t>
+            </a:r>
+            <a:r>
+              <a:rPr lang="en-US" dirty="0">
+                <a:solidFill>
+                  <a:srgbClr val="FF0000"/>
+                </a:solidFill>
+                <a:latin typeface="Courier" pitchFamily="2" charset="0"/>
+              </a:rPr>
+              <a:t>+</a:t>
+            </a:r>
+            <a:r>
+              <a:rPr lang="en-US" dirty="0">
+                <a:latin typeface="Courier" pitchFamily="2" charset="0"/>
+              </a:rPr>
+              <a:t> 31 </a:t>
+            </a:r>
+            <a:r>
+              <a:rPr lang="en-US" dirty="0">
+                <a:solidFill>
+                  <a:srgbClr val="FF0000"/>
+                </a:solidFill>
+                <a:latin typeface="Courier" pitchFamily="2" charset="0"/>
+              </a:rPr>
+              <a:t>+</a:t>
+            </a:r>
+            <a:r>
+              <a:rPr lang="en-US" dirty="0">
+                <a:latin typeface="Courier" pitchFamily="2" charset="0"/>
+              </a:rPr>
+              <a:t> 31 </a:t>
+            </a:r>
+            <a:r>
+              <a:rPr lang="en-US" dirty="0">
+                <a:solidFill>
+                  <a:srgbClr val="FF0000"/>
+                </a:solidFill>
+                <a:latin typeface="Courier" pitchFamily="2" charset="0"/>
+              </a:rPr>
+              <a:t>+</a:t>
+            </a:r>
+            <a:r>
+              <a:rPr lang="en-US" dirty="0">
+                <a:latin typeface="Courier" pitchFamily="2" charset="0"/>
+              </a:rPr>
+              <a:t> 30 </a:t>
+            </a:r>
+            <a:r>
+              <a:rPr lang="en-US" dirty="0">
+                <a:solidFill>
+                  <a:srgbClr val="FF0000"/>
+                </a:solidFill>
+                <a:latin typeface="Courier" pitchFamily="2" charset="0"/>
+              </a:rPr>
+              <a:t>+</a:t>
+            </a:r>
+            <a:r>
+              <a:rPr lang="en-US" dirty="0">
+                <a:latin typeface="Courier" pitchFamily="2" charset="0"/>
+              </a:rPr>
+              <a:t> 31;</a:t>
+            </a:r>
+          </a:p>
+          <a:p>
+            <a:pPr marL="0" indent="0">
+              <a:buNone/>
+            </a:pPr>
+            <a:r>
+              <a:rPr lang="en-US" dirty="0">
+                <a:latin typeface="Courier" pitchFamily="2" charset="0"/>
+              </a:rPr>
+              <a:t>    } </a:t>
+            </a:r>
+            <a:r>
+              <a:rPr lang="en-US" dirty="0">
+                <a:solidFill>
+                  <a:srgbClr val="00B050"/>
+                </a:solidFill>
+                <a:latin typeface="Courier" pitchFamily="2" charset="0"/>
+              </a:rPr>
+              <a:t>else if </a:t>
+            </a:r>
+            <a:r>
+              <a:rPr lang="en-US" dirty="0">
+                <a:latin typeface="Courier" pitchFamily="2" charset="0"/>
+              </a:rPr>
+              <a:t>(month </a:t>
+            </a:r>
+            <a:r>
+              <a:rPr lang="en-US" dirty="0">
+                <a:solidFill>
+                  <a:srgbClr val="FF0000"/>
+                </a:solidFill>
+                <a:latin typeface="Courier" pitchFamily="2" charset="0"/>
+              </a:rPr>
+              <a:t>==</a:t>
+            </a:r>
+            <a:r>
+              <a:rPr lang="en-US" dirty="0">
+                <a:latin typeface="Courier" pitchFamily="2" charset="0"/>
+              </a:rPr>
+              <a:t> 12) {</a:t>
+            </a:r>
+          </a:p>
+          <a:p>
+            <a:pPr marL="0" indent="0">
+              <a:buNone/>
+            </a:pPr>
+            <a:r>
+              <a:rPr lang="en-US" dirty="0">
+                <a:latin typeface="Courier" pitchFamily="2" charset="0"/>
+              </a:rPr>
+              <a:t>        </a:t>
+            </a:r>
+            <a:r>
+              <a:rPr lang="en-US" dirty="0" err="1">
+                <a:latin typeface="Courier" pitchFamily="2" charset="0"/>
+              </a:rPr>
+              <a:t>dayOfMonth</a:t>
+            </a:r>
+            <a:r>
+              <a:rPr lang="en-US" dirty="0">
+                <a:latin typeface="Courier" pitchFamily="2" charset="0"/>
+              </a:rPr>
+              <a:t> </a:t>
+            </a:r>
+            <a:r>
+              <a:rPr lang="en-US" dirty="0">
+                <a:solidFill>
+                  <a:srgbClr val="FF0000"/>
+                </a:solidFill>
+                <a:latin typeface="Courier" pitchFamily="2" charset="0"/>
+              </a:rPr>
+              <a:t>+=</a:t>
+            </a:r>
+            <a:r>
+              <a:rPr lang="en-US" dirty="0">
+                <a:latin typeface="Courier" pitchFamily="2" charset="0"/>
+              </a:rPr>
+              <a:t> 31 </a:t>
+            </a:r>
+            <a:r>
+              <a:rPr lang="en-US" dirty="0">
+                <a:solidFill>
+                  <a:srgbClr val="FF0000"/>
+                </a:solidFill>
+                <a:latin typeface="Courier" pitchFamily="2" charset="0"/>
+              </a:rPr>
+              <a:t>+</a:t>
+            </a:r>
+            <a:r>
+              <a:rPr lang="en-US" dirty="0">
+                <a:latin typeface="Courier" pitchFamily="2" charset="0"/>
+              </a:rPr>
+              <a:t> 28 </a:t>
+            </a:r>
+            <a:r>
+              <a:rPr lang="en-US" dirty="0">
+                <a:solidFill>
+                  <a:srgbClr val="FF0000"/>
+                </a:solidFill>
+                <a:latin typeface="Courier" pitchFamily="2" charset="0"/>
+              </a:rPr>
+              <a:t>+</a:t>
+            </a:r>
+            <a:r>
+              <a:rPr lang="en-US" dirty="0">
+                <a:latin typeface="Courier" pitchFamily="2" charset="0"/>
+              </a:rPr>
+              <a:t> 31 </a:t>
+            </a:r>
+            <a:r>
+              <a:rPr lang="en-US" dirty="0">
+                <a:solidFill>
+                  <a:srgbClr val="FF0000"/>
+                </a:solidFill>
+                <a:latin typeface="Courier" pitchFamily="2" charset="0"/>
+              </a:rPr>
+              <a:t>+</a:t>
+            </a:r>
+            <a:r>
+              <a:rPr lang="en-US" dirty="0">
+                <a:latin typeface="Courier" pitchFamily="2" charset="0"/>
+              </a:rPr>
+              <a:t> 30 </a:t>
+            </a:r>
+            <a:r>
+              <a:rPr lang="en-US" dirty="0">
+                <a:solidFill>
+                  <a:srgbClr val="FF0000"/>
+                </a:solidFill>
+                <a:latin typeface="Courier" pitchFamily="2" charset="0"/>
+              </a:rPr>
+              <a:t>+</a:t>
+            </a:r>
+            <a:r>
+              <a:rPr lang="en-US" dirty="0">
+                <a:latin typeface="Courier" pitchFamily="2" charset="0"/>
+              </a:rPr>
+              <a:t> 31 </a:t>
+            </a:r>
+            <a:r>
+              <a:rPr lang="en-US" dirty="0">
+                <a:solidFill>
+                  <a:srgbClr val="FF0000"/>
+                </a:solidFill>
+                <a:latin typeface="Courier" pitchFamily="2" charset="0"/>
+              </a:rPr>
+              <a:t>+</a:t>
+            </a:r>
+            <a:r>
+              <a:rPr lang="en-US" dirty="0">
+                <a:latin typeface="Courier" pitchFamily="2" charset="0"/>
+              </a:rPr>
+              <a:t> 30 </a:t>
+            </a:r>
+            <a:r>
+              <a:rPr lang="en-US" dirty="0">
+                <a:solidFill>
+                  <a:srgbClr val="FF0000"/>
+                </a:solidFill>
+                <a:latin typeface="Courier" pitchFamily="2" charset="0"/>
+              </a:rPr>
+              <a:t>+</a:t>
+            </a:r>
+            <a:r>
+              <a:rPr lang="en-US" dirty="0">
+                <a:latin typeface="Courier" pitchFamily="2" charset="0"/>
+              </a:rPr>
+              <a:t> 31 </a:t>
+            </a:r>
+            <a:r>
+              <a:rPr lang="en-US" dirty="0">
+                <a:solidFill>
+                  <a:srgbClr val="FF0000"/>
+                </a:solidFill>
+                <a:latin typeface="Courier" pitchFamily="2" charset="0"/>
+              </a:rPr>
+              <a:t>+</a:t>
+            </a:r>
+            <a:r>
+              <a:rPr lang="en-US" dirty="0">
+                <a:latin typeface="Courier" pitchFamily="2" charset="0"/>
+              </a:rPr>
+              <a:t> 31 </a:t>
+            </a:r>
+            <a:r>
+              <a:rPr lang="en-US" dirty="0">
+                <a:solidFill>
+                  <a:srgbClr val="FF0000"/>
+                </a:solidFill>
+                <a:latin typeface="Courier" pitchFamily="2" charset="0"/>
+              </a:rPr>
+              <a:t>+</a:t>
+            </a:r>
+            <a:r>
+              <a:rPr lang="en-US" dirty="0">
+                <a:latin typeface="Courier" pitchFamily="2" charset="0"/>
+              </a:rPr>
+              <a:t> 30 </a:t>
+            </a:r>
+            <a:r>
+              <a:rPr lang="en-US" dirty="0">
+                <a:solidFill>
+                  <a:srgbClr val="FF0000"/>
+                </a:solidFill>
+                <a:latin typeface="Courier" pitchFamily="2" charset="0"/>
+              </a:rPr>
+              <a:t>+</a:t>
+            </a:r>
+            <a:r>
+              <a:rPr lang="en-US" dirty="0">
+                <a:latin typeface="Courier" pitchFamily="2" charset="0"/>
+              </a:rPr>
+              <a:t> 31</a:t>
+            </a:r>
+            <a:r>
+              <a:rPr lang="en-US" dirty="0">
+                <a:solidFill>
+                  <a:srgbClr val="FF0000"/>
+                </a:solidFill>
+                <a:latin typeface="Courier" pitchFamily="2" charset="0"/>
+              </a:rPr>
+              <a:t> + </a:t>
+            </a:r>
+            <a:r>
+              <a:rPr lang="en-US" dirty="0">
+                <a:latin typeface="Courier" pitchFamily="2" charset="0"/>
+              </a:rPr>
+              <a:t>31;</a:t>
+            </a:r>
+          </a:p>
+          <a:p>
+            <a:pPr marL="0" indent="0">
+              <a:buNone/>
+            </a:pPr>
+            <a:r>
+              <a:rPr lang="en-US" dirty="0">
+                <a:latin typeface="Courier" pitchFamily="2" charset="0"/>
+              </a:rPr>
+              <a:t>    }</a:t>
+            </a:r>
+          </a:p>
+          <a:p>
+            <a:pPr marL="0" indent="0">
+              <a:buNone/>
+            </a:pPr>
+            <a:r>
+              <a:rPr lang="en-US" dirty="0">
+                <a:latin typeface="Courier" pitchFamily="2" charset="0"/>
+              </a:rPr>
+              <a:t>    </a:t>
+            </a:r>
+            <a:r>
+              <a:rPr lang="en-US" dirty="0">
+                <a:solidFill>
+                  <a:srgbClr val="00B050"/>
+                </a:solidFill>
+                <a:latin typeface="Courier" pitchFamily="2" charset="0"/>
+              </a:rPr>
+              <a:t>return</a:t>
+            </a:r>
+            <a:r>
+              <a:rPr lang="en-US" dirty="0">
+                <a:latin typeface="Courier" pitchFamily="2" charset="0"/>
+              </a:rPr>
+              <a:t> </a:t>
+            </a:r>
+            <a:r>
+              <a:rPr lang="en-US" dirty="0" err="1">
+                <a:latin typeface="Courier" pitchFamily="2" charset="0"/>
+              </a:rPr>
+              <a:t>dayOfMonth</a:t>
+            </a:r>
+            <a:r>
+              <a:rPr lang="en-US" dirty="0">
+                <a:latin typeface="Courier" pitchFamily="2" charset="0"/>
+              </a:rPr>
+              <a:t>;</a:t>
+            </a:r>
+          </a:p>
+          <a:p>
+            <a:pPr marL="0" indent="0">
+              <a:buNone/>
+            </a:pPr>
+            <a:r>
+              <a:rPr lang="en-US" dirty="0">
+                <a:latin typeface="Courier" pitchFamily="2" charset="0"/>
+              </a:rPr>
+              <a:t>}</a:t>
+            </a:r>
+          </a:p>
+        </p:txBody>
+      </p:sp>
+    </p:spTree>
+    <p:extLst>
+      <p:ext uri="{BB962C8B-B14F-4D97-AF65-F5344CB8AC3E}">
+        <p14:creationId xmlns:p14="http://schemas.microsoft.com/office/powerpoint/2010/main" val="2933475609"/>
       </p:ext>
     </p:extLst>
   </p:cSld>

</xml_diff>